<commit_message>
26-Dec-20 Update -- updated driver agents -- updated convex hull mechanic -- added cross product
</commit_message>
<xml_diff>
--- a/AGM Model Design Spec/F1 Model AGM Presentation.pptx
+++ b/AGM Model Design Spec/F1 Model AGM Presentation.pptx
@@ -115,6 +115,11 @@
       </a:defRPr>
     </a:lvl9pPr>
   </p:defaultTextStyle>
+  <p:extLst>
+    <p:ext uri="{EFAFB233-063F-42B5-8137-9DF3F51BA10A}">
+      <p15:sldGuideLst xmlns:p15="http://schemas.microsoft.com/office/powerpoint/2012/main"/>
+    </p:ext>
+  </p:extLst>
 </p:presentation>
 </file>
 
@@ -449,7 +454,7 @@
           <a:p>
             <a:fld id="{91BE9312-32A9-41BE-8F59-C7A04E6627F1}" type="datetimeFigureOut">
               <a:rPr lang="en-US" smtClean="0"/>
-              <a:t>11/3/2020</a:t>
+              <a:t>11/23/2020</a:t>
             </a:fld>
             <a:endParaRPr lang="en-US"/>
           </a:p>
@@ -773,7 +778,7 @@
           <a:p>
             <a:fld id="{91BE9312-32A9-41BE-8F59-C7A04E6627F1}" type="datetimeFigureOut">
               <a:rPr lang="en-US" smtClean="0"/>
-              <a:t>11/3/2020</a:t>
+              <a:t>11/23/2020</a:t>
             </a:fld>
             <a:endParaRPr lang="en-US"/>
           </a:p>
@@ -1021,7 +1026,7 @@
           <a:p>
             <a:fld id="{91BE9312-32A9-41BE-8F59-C7A04E6627F1}" type="datetimeFigureOut">
               <a:rPr lang="en-US" smtClean="0"/>
-              <a:t>11/3/2020</a:t>
+              <a:t>11/23/2020</a:t>
             </a:fld>
             <a:endParaRPr lang="en-US"/>
           </a:p>
@@ -1360,7 +1365,7 @@
           <a:p>
             <a:fld id="{91BE9312-32A9-41BE-8F59-C7A04E6627F1}" type="datetimeFigureOut">
               <a:rPr lang="en-US" smtClean="0"/>
-              <a:t>11/3/2020</a:t>
+              <a:t>11/23/2020</a:t>
             </a:fld>
             <a:endParaRPr lang="en-US"/>
           </a:p>
@@ -1707,7 +1712,7 @@
           <a:p>
             <a:fld id="{91BE9312-32A9-41BE-8F59-C7A04E6627F1}" type="datetimeFigureOut">
               <a:rPr lang="en-US" smtClean="0"/>
-              <a:t>11/3/2020</a:t>
+              <a:t>11/23/2020</a:t>
             </a:fld>
             <a:endParaRPr lang="en-US"/>
           </a:p>
@@ -2081,7 +2086,7 @@
           <a:p>
             <a:fld id="{91BE9312-32A9-41BE-8F59-C7A04E6627F1}" type="datetimeFigureOut">
               <a:rPr lang="en-US" smtClean="0"/>
-              <a:t>11/3/2020</a:t>
+              <a:t>11/23/2020</a:t>
             </a:fld>
             <a:endParaRPr lang="en-US"/>
           </a:p>
@@ -2551,7 +2556,7 @@
           <a:p>
             <a:fld id="{91BE9312-32A9-41BE-8F59-C7A04E6627F1}" type="datetimeFigureOut">
               <a:rPr lang="en-US" smtClean="0"/>
-              <a:t>11/3/2020</a:t>
+              <a:t>11/23/2020</a:t>
             </a:fld>
             <a:endParaRPr lang="en-US"/>
           </a:p>
@@ -2756,7 +2761,7 @@
           <a:p>
             <a:fld id="{91BE9312-32A9-41BE-8F59-C7A04E6627F1}" type="datetimeFigureOut">
               <a:rPr lang="en-US" smtClean="0"/>
-              <a:t>11/3/2020</a:t>
+              <a:t>11/23/2020</a:t>
             </a:fld>
             <a:endParaRPr lang="en-US"/>
           </a:p>
@@ -2967,7 +2972,7 @@
           <a:p>
             <a:fld id="{91BE9312-32A9-41BE-8F59-C7A04E6627F1}" type="datetimeFigureOut">
               <a:rPr lang="en-US" smtClean="0"/>
-              <a:t>11/3/2020</a:t>
+              <a:t>11/23/2020</a:t>
             </a:fld>
             <a:endParaRPr lang="en-US"/>
           </a:p>
@@ -3199,7 +3204,7 @@
           <a:p>
             <a:fld id="{91BE9312-32A9-41BE-8F59-C7A04E6627F1}" type="datetimeFigureOut">
               <a:rPr lang="en-US" smtClean="0"/>
-              <a:t>11/3/2020</a:t>
+              <a:t>11/23/2020</a:t>
             </a:fld>
             <a:endParaRPr lang="en-US"/>
           </a:p>
@@ -3447,7 +3452,7 @@
           <a:p>
             <a:fld id="{91BE9312-32A9-41BE-8F59-C7A04E6627F1}" type="datetimeFigureOut">
               <a:rPr lang="en-US" smtClean="0"/>
-              <a:t>11/3/2020</a:t>
+              <a:t>11/23/2020</a:t>
             </a:fld>
             <a:endParaRPr lang="en-US"/>
           </a:p>
@@ -3745,7 +3750,7 @@
           <a:p>
             <a:fld id="{91BE9312-32A9-41BE-8F59-C7A04E6627F1}" type="datetimeFigureOut">
               <a:rPr lang="en-US" smtClean="0"/>
-              <a:t>11/3/2020</a:t>
+              <a:t>11/23/2020</a:t>
             </a:fld>
             <a:endParaRPr lang="en-US"/>
           </a:p>
@@ -4139,7 +4144,7 @@
           <a:p>
             <a:fld id="{91BE9312-32A9-41BE-8F59-C7A04E6627F1}" type="datetimeFigureOut">
               <a:rPr lang="en-US" smtClean="0"/>
-              <a:t>11/3/2020</a:t>
+              <a:t>11/23/2020</a:t>
             </a:fld>
             <a:endParaRPr lang="en-US"/>
           </a:p>
@@ -4288,7 +4293,7 @@
           <a:p>
             <a:fld id="{91BE9312-32A9-41BE-8F59-C7A04E6627F1}" type="datetimeFigureOut">
               <a:rPr lang="en-US" smtClean="0"/>
-              <a:t>11/3/2020</a:t>
+              <a:t>11/23/2020</a:t>
             </a:fld>
             <a:endParaRPr lang="en-US"/>
           </a:p>
@@ -4414,7 +4419,7 @@
           <a:p>
             <a:fld id="{91BE9312-32A9-41BE-8F59-C7A04E6627F1}" type="datetimeFigureOut">
               <a:rPr lang="en-US" smtClean="0"/>
-              <a:t>11/3/2020</a:t>
+              <a:t>11/23/2020</a:t>
             </a:fld>
             <a:endParaRPr lang="en-US"/>
           </a:p>
@@ -4669,7 +4674,7 @@
           <a:p>
             <a:fld id="{91BE9312-32A9-41BE-8F59-C7A04E6627F1}" type="datetimeFigureOut">
               <a:rPr lang="en-US" smtClean="0"/>
-              <a:t>11/3/2020</a:t>
+              <a:t>11/23/2020</a:t>
             </a:fld>
             <a:endParaRPr lang="en-US"/>
           </a:p>
@@ -4984,7 +4989,7 @@
           <a:p>
             <a:fld id="{91BE9312-32A9-41BE-8F59-C7A04E6627F1}" type="datetimeFigureOut">
               <a:rPr lang="en-US" smtClean="0"/>
-              <a:t>11/3/2020</a:t>
+              <a:t>11/23/2020</a:t>
             </a:fld>
             <a:endParaRPr lang="en-US"/>
           </a:p>
@@ -5335,7 +5340,7 @@
           <a:p>
             <a:fld id="{91BE9312-32A9-41BE-8F59-C7A04E6627F1}" type="datetimeFigureOut">
               <a:rPr lang="en-US" smtClean="0"/>
-              <a:t>11/3/2020</a:t>
+              <a:t>11/23/2020</a:t>
             </a:fld>
             <a:endParaRPr lang="en-US"/>
           </a:p>

</xml_diff>